<commit_message>
rough cast of slides for presentation
</commit_message>
<xml_diff>
--- a/submissions/w2/w2_OKB-C.pptx
+++ b/submissions/w2/w2_OKB-C.pptx
@@ -111,6 +111,11 @@
       </a:defRPr>
     </a:lvl9pPr>
   </p:defaultTextStyle>
+  <p:extLst>
+    <p:ext uri="{EFAFB233-063F-42B5-8137-9DF3F51BA10A}">
+      <p15:sldGuideLst xmlns:p15="http://schemas.microsoft.com/office/powerpoint/2012/main"/>
+    </p:ext>
+  </p:extLst>
 </p:presentation>
 </file>
 
@@ -245,7 +250,7 @@
           <a:p>
             <a:fld id="{32B53D97-3AD9-4C9F-B685-94A1392165C1}" type="datetimeFigureOut">
               <a:rPr lang="de-DE" smtClean="0"/>
-              <a:t>25.04.2016</a:t>
+              <a:t>26.04.2016</a:t>
             </a:fld>
             <a:endParaRPr lang="de-DE"/>
           </a:p>
@@ -415,7 +420,7 @@
           <a:p>
             <a:fld id="{32B53D97-3AD9-4C9F-B685-94A1392165C1}" type="datetimeFigureOut">
               <a:rPr lang="de-DE" smtClean="0"/>
-              <a:t>25.04.2016</a:t>
+              <a:t>26.04.2016</a:t>
             </a:fld>
             <a:endParaRPr lang="de-DE"/>
           </a:p>
@@ -595,7 +600,7 @@
           <a:p>
             <a:fld id="{32B53D97-3AD9-4C9F-B685-94A1392165C1}" type="datetimeFigureOut">
               <a:rPr lang="de-DE" smtClean="0"/>
-              <a:t>25.04.2016</a:t>
+              <a:t>26.04.2016</a:t>
             </a:fld>
             <a:endParaRPr lang="de-DE"/>
           </a:p>
@@ -765,7 +770,7 @@
           <a:p>
             <a:fld id="{32B53D97-3AD9-4C9F-B685-94A1392165C1}" type="datetimeFigureOut">
               <a:rPr lang="de-DE" smtClean="0"/>
-              <a:t>25.04.2016</a:t>
+              <a:t>26.04.2016</a:t>
             </a:fld>
             <a:endParaRPr lang="de-DE"/>
           </a:p>
@@ -1011,7 +1016,7 @@
           <a:p>
             <a:fld id="{32B53D97-3AD9-4C9F-B685-94A1392165C1}" type="datetimeFigureOut">
               <a:rPr lang="de-DE" smtClean="0"/>
-              <a:t>25.04.2016</a:t>
+              <a:t>26.04.2016</a:t>
             </a:fld>
             <a:endParaRPr lang="de-DE"/>
           </a:p>
@@ -1243,7 +1248,7 @@
           <a:p>
             <a:fld id="{32B53D97-3AD9-4C9F-B685-94A1392165C1}" type="datetimeFigureOut">
               <a:rPr lang="de-DE" smtClean="0"/>
-              <a:t>25.04.2016</a:t>
+              <a:t>26.04.2016</a:t>
             </a:fld>
             <a:endParaRPr lang="de-DE"/>
           </a:p>
@@ -1610,7 +1615,7 @@
           <a:p>
             <a:fld id="{32B53D97-3AD9-4C9F-B685-94A1392165C1}" type="datetimeFigureOut">
               <a:rPr lang="de-DE" smtClean="0"/>
-              <a:t>25.04.2016</a:t>
+              <a:t>26.04.2016</a:t>
             </a:fld>
             <a:endParaRPr lang="de-DE"/>
           </a:p>
@@ -1728,7 +1733,7 @@
           <a:p>
             <a:fld id="{32B53D97-3AD9-4C9F-B685-94A1392165C1}" type="datetimeFigureOut">
               <a:rPr lang="de-DE" smtClean="0"/>
-              <a:t>25.04.2016</a:t>
+              <a:t>26.04.2016</a:t>
             </a:fld>
             <a:endParaRPr lang="de-DE"/>
           </a:p>
@@ -1823,7 +1828,7 @@
           <a:p>
             <a:fld id="{32B53D97-3AD9-4C9F-B685-94A1392165C1}" type="datetimeFigureOut">
               <a:rPr lang="de-DE" smtClean="0"/>
-              <a:t>25.04.2016</a:t>
+              <a:t>26.04.2016</a:t>
             </a:fld>
             <a:endParaRPr lang="de-DE"/>
           </a:p>
@@ -2100,7 +2105,7 @@
           <a:p>
             <a:fld id="{32B53D97-3AD9-4C9F-B685-94A1392165C1}" type="datetimeFigureOut">
               <a:rPr lang="de-DE" smtClean="0"/>
-              <a:t>25.04.2016</a:t>
+              <a:t>26.04.2016</a:t>
             </a:fld>
             <a:endParaRPr lang="de-DE"/>
           </a:p>
@@ -2353,7 +2358,7 @@
           <a:p>
             <a:fld id="{32B53D97-3AD9-4C9F-B685-94A1392165C1}" type="datetimeFigureOut">
               <a:rPr lang="de-DE" smtClean="0"/>
-              <a:t>25.04.2016</a:t>
+              <a:t>26.04.2016</a:t>
             </a:fld>
             <a:endParaRPr lang="de-DE"/>
           </a:p>
@@ -2566,7 +2571,7 @@
           <a:p>
             <a:fld id="{32B53D97-3AD9-4C9F-B685-94A1392165C1}" type="datetimeFigureOut">
               <a:rPr lang="de-DE" smtClean="0"/>
-              <a:t>25.04.2016</a:t>
+              <a:t>26.04.2016</a:t>
             </a:fld>
             <a:endParaRPr lang="de-DE"/>
           </a:p>
@@ -3108,37 +3113,260 @@
           </a:xfrm>
         </p:spPr>
         <p:txBody>
-          <a:bodyPr/>
-          <a:lstStyle/>
-          <a:p>
-            <a:r>
-              <a:rPr lang="de-DE" dirty="0" smtClean="0"/>
-              <a:t>X</a:t>
-            </a:r>
-          </a:p>
-          <a:p>
-            <a:r>
-              <a:rPr lang="de-DE" dirty="0" smtClean="0"/>
-              <a:t>X</a:t>
-            </a:r>
-          </a:p>
-          <a:p>
-            <a:r>
-              <a:rPr lang="de-DE" dirty="0" smtClean="0"/>
-              <a:t>X</a:t>
-            </a:r>
-          </a:p>
-          <a:p>
-            <a:r>
-              <a:rPr lang="de-DE" dirty="0" smtClean="0"/>
-              <a:t>X</a:t>
-            </a:r>
-          </a:p>
-          <a:p>
-            <a:r>
-              <a:rPr lang="de-DE" dirty="0" smtClean="0"/>
-              <a:t>X</a:t>
-            </a:r>
+          <a:bodyPr>
+            <a:normAutofit fontScale="92500"/>
+          </a:bodyPr>
+          <a:lstStyle/>
+          <a:p>
+            <a:r>
+              <a:rPr lang="de-DE" dirty="0" err="1"/>
+              <a:t>s</a:t>
+            </a:r>
+            <a:r>
+              <a:rPr lang="de-DE" dirty="0" err="1" smtClean="0"/>
+              <a:t>et</a:t>
+            </a:r>
+            <a:r>
+              <a:rPr lang="de-DE" dirty="0" smtClean="0"/>
+              <a:t> </a:t>
+            </a:r>
+            <a:r>
+              <a:rPr lang="de-DE" dirty="0" err="1" smtClean="0"/>
+              <a:t>up</a:t>
+            </a:r>
+            <a:r>
+              <a:rPr lang="de-DE" dirty="0" smtClean="0"/>
+              <a:t> a </a:t>
+            </a:r>
+            <a:r>
+              <a:rPr lang="de-DE" dirty="0" err="1" smtClean="0"/>
+              <a:t>Maven</a:t>
+            </a:r>
+            <a:r>
+              <a:rPr lang="de-DE" dirty="0" smtClean="0"/>
+              <a:t> </a:t>
+            </a:r>
+            <a:r>
+              <a:rPr lang="de-DE" dirty="0" err="1" smtClean="0"/>
+              <a:t>project</a:t>
+            </a:r>
+            <a:r>
+              <a:rPr lang="de-DE" dirty="0" smtClean="0"/>
+              <a:t> </a:t>
+            </a:r>
+            <a:r>
+              <a:rPr lang="de-DE" dirty="0" err="1" smtClean="0"/>
+              <a:t>for</a:t>
+            </a:r>
+            <a:r>
+              <a:rPr lang="de-DE" dirty="0" smtClean="0"/>
+              <a:t> </a:t>
+            </a:r>
+            <a:r>
+              <a:rPr lang="de-DE" dirty="0" err="1" smtClean="0"/>
+              <a:t>the</a:t>
+            </a:r>
+            <a:r>
+              <a:rPr lang="de-DE" dirty="0" smtClean="0"/>
+              <a:t> server-</a:t>
+            </a:r>
+            <a:r>
+              <a:rPr lang="de-DE" dirty="0" err="1" smtClean="0"/>
+              <a:t>side</a:t>
+            </a:r>
+            <a:r>
+              <a:rPr lang="de-DE" dirty="0" smtClean="0"/>
+              <a:t> </a:t>
+            </a:r>
+            <a:r>
+              <a:rPr lang="de-DE" dirty="0" err="1" smtClean="0"/>
+              <a:t>software</a:t>
+            </a:r>
+            <a:endParaRPr lang="de-DE" dirty="0" smtClean="0"/>
+          </a:p>
+          <a:p>
+            <a:r>
+              <a:rPr lang="de-DE" dirty="0" err="1"/>
+              <a:t>c</a:t>
+            </a:r>
+            <a:r>
+              <a:rPr lang="de-DE" dirty="0" err="1" smtClean="0"/>
+              <a:t>reate</a:t>
+            </a:r>
+            <a:r>
+              <a:rPr lang="de-DE" dirty="0" smtClean="0"/>
+              <a:t> a prototype in Java </a:t>
+            </a:r>
+            <a:r>
+              <a:rPr lang="de-DE" dirty="0" err="1" smtClean="0"/>
+              <a:t>to</a:t>
+            </a:r>
+            <a:r>
+              <a:rPr lang="de-DE" dirty="0" smtClean="0"/>
+              <a:t> </a:t>
+            </a:r>
+            <a:r>
+              <a:rPr lang="de-DE" dirty="0" err="1" smtClean="0"/>
+              <a:t>read</a:t>
+            </a:r>
+            <a:r>
+              <a:rPr lang="de-DE" dirty="0" smtClean="0"/>
+              <a:t> </a:t>
+            </a:r>
+            <a:r>
+              <a:rPr lang="de-DE" dirty="0" err="1" smtClean="0"/>
+              <a:t>data</a:t>
+            </a:r>
+            <a:r>
+              <a:rPr lang="de-DE" dirty="0" smtClean="0"/>
+              <a:t> </a:t>
+            </a:r>
+            <a:r>
+              <a:rPr lang="de-DE" dirty="0" err="1" smtClean="0"/>
+              <a:t>of</a:t>
+            </a:r>
+            <a:r>
+              <a:rPr lang="de-DE" dirty="0" smtClean="0"/>
+              <a:t> a </a:t>
+            </a:r>
+            <a:r>
+              <a:rPr lang="de-DE" dirty="0" err="1" smtClean="0"/>
+              <a:t>specific</a:t>
+            </a:r>
+            <a:r>
+              <a:rPr lang="de-DE" dirty="0" smtClean="0"/>
+              <a:t> item </a:t>
+            </a:r>
+            <a:r>
+              <a:rPr lang="de-DE" dirty="0" err="1" smtClean="0"/>
+              <a:t>from</a:t>
+            </a:r>
+            <a:r>
+              <a:rPr lang="de-DE" dirty="0" smtClean="0"/>
+              <a:t> </a:t>
+            </a:r>
+            <a:r>
+              <a:rPr lang="de-DE" dirty="0" err="1" smtClean="0"/>
+              <a:t>Wikidata</a:t>
+            </a:r>
+            <a:r>
+              <a:rPr lang="de-DE" dirty="0" smtClean="0"/>
+              <a:t> </a:t>
+            </a:r>
+            <a:r>
+              <a:rPr lang="de-DE" dirty="0" err="1" smtClean="0"/>
+              <a:t>and</a:t>
+            </a:r>
+            <a:r>
+              <a:rPr lang="de-DE" dirty="0" smtClean="0"/>
+              <a:t> </a:t>
+            </a:r>
+            <a:r>
+              <a:rPr lang="de-DE" dirty="0" err="1" smtClean="0"/>
+              <a:t>print</a:t>
+            </a:r>
+            <a:r>
+              <a:rPr lang="de-DE" dirty="0" smtClean="0"/>
+              <a:t> </a:t>
+            </a:r>
+            <a:r>
+              <a:rPr lang="de-DE" dirty="0" err="1" smtClean="0"/>
+              <a:t>it</a:t>
+            </a:r>
+            <a:endParaRPr lang="de-DE" dirty="0" smtClean="0"/>
+          </a:p>
+          <a:p>
+            <a:r>
+              <a:rPr lang="de-DE" dirty="0" err="1" smtClean="0"/>
+              <a:t>create</a:t>
+            </a:r>
+            <a:r>
+              <a:rPr lang="de-DE" dirty="0" smtClean="0"/>
+              <a:t> prototype in </a:t>
+            </a:r>
+            <a:r>
+              <a:rPr lang="de-DE" dirty="0" err="1" smtClean="0"/>
+              <a:t>Javascript</a:t>
+            </a:r>
+            <a:r>
+              <a:rPr lang="de-DE" dirty="0" smtClean="0"/>
+              <a:t> </a:t>
+            </a:r>
+            <a:r>
+              <a:rPr lang="de-DE" dirty="0" err="1" smtClean="0"/>
+              <a:t>and</a:t>
+            </a:r>
+            <a:r>
+              <a:rPr lang="de-DE" dirty="0" smtClean="0"/>
+              <a:t> </a:t>
+            </a:r>
+            <a:r>
+              <a:rPr lang="de-DE" dirty="0" err="1" smtClean="0"/>
+              <a:t>read</a:t>
+            </a:r>
+            <a:r>
+              <a:rPr lang="de-DE" dirty="0" smtClean="0"/>
+              <a:t> </a:t>
+            </a:r>
+            <a:r>
+              <a:rPr lang="de-DE" dirty="0" err="1" smtClean="0"/>
+              <a:t>data</a:t>
+            </a:r>
+            <a:r>
+              <a:rPr lang="de-DE" dirty="0" smtClean="0"/>
+              <a:t> </a:t>
+            </a:r>
+            <a:r>
+              <a:rPr lang="de-DE" dirty="0" err="1" smtClean="0"/>
+              <a:t>of</a:t>
+            </a:r>
+            <a:r>
+              <a:rPr lang="de-DE" dirty="0" smtClean="0"/>
+              <a:t> </a:t>
+            </a:r>
+            <a:r>
+              <a:rPr lang="de-DE" dirty="0" err="1" smtClean="0"/>
+              <a:t>specific</a:t>
+            </a:r>
+            <a:r>
+              <a:rPr lang="de-DE" dirty="0" smtClean="0"/>
+              <a:t> item form </a:t>
+            </a:r>
+            <a:r>
+              <a:rPr lang="de-DE" dirty="0" err="1" smtClean="0"/>
+              <a:t>Wikidata</a:t>
+            </a:r>
+            <a:r>
+              <a:rPr lang="de-DE" dirty="0" smtClean="0"/>
+              <a:t> </a:t>
+            </a:r>
+            <a:r>
+              <a:rPr lang="de-DE" dirty="0" err="1" smtClean="0"/>
+              <a:t>and</a:t>
+            </a:r>
+            <a:r>
+              <a:rPr lang="de-DE" dirty="0" smtClean="0"/>
+              <a:t> </a:t>
+            </a:r>
+            <a:r>
+              <a:rPr lang="de-DE" dirty="0" err="1" smtClean="0"/>
+              <a:t>display</a:t>
+            </a:r>
+            <a:r>
+              <a:rPr lang="de-DE" dirty="0" smtClean="0"/>
+              <a:t> </a:t>
+            </a:r>
+            <a:r>
+              <a:rPr lang="de-DE" dirty="0" err="1" smtClean="0"/>
+              <a:t>it</a:t>
+            </a:r>
+            <a:endParaRPr lang="de-DE" dirty="0" smtClean="0"/>
+          </a:p>
+          <a:p>
+            <a:pPr marL="0" indent="0">
+              <a:buNone/>
+            </a:pPr>
+            <a:endParaRPr lang="de-DE" dirty="0" smtClean="0"/>
           </a:p>
           <a:p>
             <a:endParaRPr lang="de-DE" dirty="0" smtClean="0"/>
@@ -3222,7 +3450,7 @@
         <p:spPr>
           <a:xfrm>
             <a:off x="5380383" y="1590261"/>
-            <a:ext cx="5327374" cy="646331"/>
+            <a:ext cx="5327374" cy="1754326"/>
           </a:xfrm>
           <a:prstGeom prst="rect">
             <a:avLst/>
@@ -3240,9 +3468,168 @@
               <a:buChar char="•"/>
             </a:pPr>
             <a:r>
-              <a:rPr lang="de-DE" dirty="0" smtClean="0"/>
-              <a:t>X</a:t>
-            </a:r>
+              <a:rPr lang="de-DE" dirty="0" err="1" smtClean="0"/>
+              <a:t>Maven</a:t>
+            </a:r>
+            <a:r>
+              <a:rPr lang="de-DE" dirty="0" smtClean="0"/>
+              <a:t> </a:t>
+            </a:r>
+            <a:r>
+              <a:rPr lang="de-DE" dirty="0" err="1" smtClean="0"/>
+              <a:t>project</a:t>
+            </a:r>
+            <a:r>
+              <a:rPr lang="de-DE" dirty="0" smtClean="0"/>
+              <a:t> was </a:t>
+            </a:r>
+            <a:r>
+              <a:rPr lang="de-DE" dirty="0" err="1" smtClean="0"/>
+              <a:t>set</a:t>
+            </a:r>
+            <a:r>
+              <a:rPr lang="de-DE" dirty="0" smtClean="0"/>
+              <a:t> </a:t>
+            </a:r>
+            <a:r>
+              <a:rPr lang="de-DE" dirty="0" err="1" smtClean="0"/>
+              <a:t>up</a:t>
+            </a:r>
+            <a:endParaRPr lang="de-DE" dirty="0" smtClean="0"/>
+          </a:p>
+          <a:p>
+            <a:pPr marL="285750" indent="-285750">
+              <a:buFont typeface="Arial" panose="020B0604020202020204" pitchFamily="34" charset="0"/>
+              <a:buChar char="•"/>
+            </a:pPr>
+            <a:r>
+              <a:rPr lang="de-DE" dirty="0" smtClean="0"/>
+              <a:t>prototype in Java </a:t>
+            </a:r>
+            <a:r>
+              <a:rPr lang="de-DE" dirty="0" err="1" smtClean="0"/>
+              <a:t>gets</a:t>
+            </a:r>
+            <a:r>
+              <a:rPr lang="de-DE" dirty="0" smtClean="0"/>
+              <a:t> </a:t>
+            </a:r>
+            <a:r>
+              <a:rPr lang="de-DE" dirty="0" err="1" smtClean="0"/>
+              <a:t>json</a:t>
+            </a:r>
+            <a:r>
+              <a:rPr lang="de-DE" dirty="0" smtClean="0"/>
+              <a:t> </a:t>
+            </a:r>
+            <a:r>
+              <a:rPr lang="de-DE" dirty="0" err="1" smtClean="0"/>
+              <a:t>data</a:t>
+            </a:r>
+            <a:r>
+              <a:rPr lang="de-DE" dirty="0" smtClean="0"/>
+              <a:t> </a:t>
+            </a:r>
+            <a:r>
+              <a:rPr lang="de-DE" dirty="0" err="1" smtClean="0"/>
+              <a:t>from</a:t>
+            </a:r>
+            <a:r>
+              <a:rPr lang="de-DE" dirty="0" smtClean="0"/>
+              <a:t> </a:t>
+            </a:r>
+            <a:r>
+              <a:rPr lang="de-DE" dirty="0" err="1" smtClean="0"/>
+              <a:t>Wikidata</a:t>
+            </a:r>
+            <a:r>
+              <a:rPr lang="de-DE" dirty="0" smtClean="0"/>
+              <a:t> REST API </a:t>
+            </a:r>
+            <a:r>
+              <a:rPr lang="de-DE" dirty="0" err="1" smtClean="0"/>
+              <a:t>and</a:t>
+            </a:r>
+            <a:r>
+              <a:rPr lang="de-DE" dirty="0" smtClean="0"/>
+              <a:t> </a:t>
+            </a:r>
+            <a:r>
+              <a:rPr lang="de-DE" dirty="0" err="1" smtClean="0"/>
+              <a:t>prints</a:t>
+            </a:r>
+            <a:r>
+              <a:rPr lang="de-DE" dirty="0" smtClean="0"/>
+              <a:t> </a:t>
+            </a:r>
+            <a:r>
+              <a:rPr lang="de-DE" dirty="0" err="1" smtClean="0"/>
+              <a:t>it</a:t>
+            </a:r>
+            <a:endParaRPr lang="de-DE" dirty="0" smtClean="0"/>
+          </a:p>
+          <a:p>
+            <a:pPr marL="285750" indent="-285750">
+              <a:buFont typeface="Arial" panose="020B0604020202020204" pitchFamily="34" charset="0"/>
+              <a:buChar char="•"/>
+            </a:pPr>
+            <a:r>
+              <a:rPr lang="de-DE" dirty="0" smtClean="0"/>
+              <a:t> prototype in </a:t>
+            </a:r>
+            <a:r>
+              <a:rPr lang="de-DE" dirty="0" err="1" smtClean="0"/>
+              <a:t>Javascript</a:t>
+            </a:r>
+            <a:r>
+              <a:rPr lang="de-DE" dirty="0" smtClean="0"/>
+              <a:t> </a:t>
+            </a:r>
+            <a:r>
+              <a:rPr lang="de-DE" dirty="0" err="1" smtClean="0"/>
+              <a:t>is</a:t>
+            </a:r>
+            <a:r>
+              <a:rPr lang="de-DE" dirty="0" smtClean="0"/>
+              <a:t> </a:t>
+            </a:r>
+            <a:r>
+              <a:rPr lang="de-DE" dirty="0" err="1" smtClean="0"/>
+              <a:t>running</a:t>
+            </a:r>
+            <a:r>
+              <a:rPr lang="de-DE" dirty="0" smtClean="0"/>
+              <a:t>  </a:t>
+            </a:r>
+            <a:r>
+              <a:rPr lang="de-DE" dirty="0" err="1" smtClean="0"/>
+              <a:t>reads</a:t>
+            </a:r>
+            <a:r>
+              <a:rPr lang="de-DE" dirty="0" smtClean="0"/>
+              <a:t> </a:t>
+            </a:r>
+            <a:r>
+              <a:rPr lang="de-DE" dirty="0" err="1" smtClean="0"/>
+              <a:t>and</a:t>
+            </a:r>
+            <a:r>
+              <a:rPr lang="de-DE" dirty="0" smtClean="0"/>
+              <a:t> </a:t>
+            </a:r>
+            <a:r>
+              <a:rPr lang="de-DE" dirty="0" err="1" smtClean="0"/>
+              <a:t>displays</a:t>
+            </a:r>
+            <a:r>
+              <a:rPr lang="de-DE" dirty="0" smtClean="0"/>
+              <a:t> </a:t>
+            </a:r>
+            <a:r>
+              <a:rPr lang="de-DE" dirty="0" err="1" smtClean="0"/>
+              <a:t>data</a:t>
+            </a:r>
+            <a:endParaRPr lang="de-DE" dirty="0" smtClean="0"/>
           </a:p>
           <a:p>
             <a:pPr marL="285750" indent="-285750">
@@ -3262,7 +3649,7 @@
         <p:spPr>
           <a:xfrm>
             <a:off x="5499652" y="4770735"/>
-            <a:ext cx="5075583" cy="369332"/>
+            <a:ext cx="5075583" cy="1200329"/>
           </a:xfrm>
           <a:prstGeom prst="rect">
             <a:avLst/>
@@ -3281,7 +3668,177 @@
             </a:pPr>
             <a:r>
               <a:rPr lang="de-DE" dirty="0" smtClean="0"/>
-              <a:t>x</a:t>
+              <a:t>due </a:t>
+            </a:r>
+            <a:r>
+              <a:rPr lang="de-DE" dirty="0" err="1" smtClean="0"/>
+              <a:t>to</a:t>
+            </a:r>
+            <a:r>
+              <a:rPr lang="de-DE" dirty="0" smtClean="0"/>
+              <a:t> lack </a:t>
+            </a:r>
+            <a:r>
+              <a:rPr lang="de-DE" dirty="0" err="1" smtClean="0"/>
+              <a:t>of</a:t>
+            </a:r>
+            <a:r>
+              <a:rPr lang="de-DE" dirty="0" smtClean="0"/>
+              <a:t> </a:t>
+            </a:r>
+            <a:r>
+              <a:rPr lang="de-DE" dirty="0" err="1" smtClean="0"/>
+              <a:t>tutorials</a:t>
+            </a:r>
+            <a:r>
+              <a:rPr lang="de-DE" dirty="0" smtClean="0"/>
+              <a:t> </a:t>
+            </a:r>
+            <a:r>
+              <a:rPr lang="de-DE" dirty="0" err="1" smtClean="0"/>
+              <a:t>setting</a:t>
+            </a:r>
+            <a:r>
+              <a:rPr lang="de-DE" dirty="0" smtClean="0"/>
+              <a:t> </a:t>
+            </a:r>
+            <a:r>
+              <a:rPr lang="de-DE" dirty="0" err="1" smtClean="0"/>
+              <a:t>up</a:t>
+            </a:r>
+            <a:r>
+              <a:rPr lang="de-DE" dirty="0" smtClean="0"/>
+              <a:t> a </a:t>
+            </a:r>
+            <a:r>
+              <a:rPr lang="de-DE" dirty="0" err="1" smtClean="0"/>
+              <a:t>Maven</a:t>
+            </a:r>
+            <a:r>
+              <a:rPr lang="de-DE" dirty="0" smtClean="0"/>
+              <a:t> </a:t>
+            </a:r>
+            <a:r>
+              <a:rPr lang="de-DE" dirty="0" err="1" smtClean="0"/>
+              <a:t>project</a:t>
+            </a:r>
+            <a:r>
+              <a:rPr lang="de-DE" dirty="0" smtClean="0"/>
+              <a:t> was </a:t>
+            </a:r>
+            <a:r>
+              <a:rPr lang="de-DE" dirty="0" err="1" smtClean="0"/>
+              <a:t>difficult</a:t>
+            </a:r>
+            <a:r>
+              <a:rPr lang="de-DE" dirty="0" smtClean="0"/>
+              <a:t>.</a:t>
+            </a:r>
+          </a:p>
+          <a:p>
+            <a:pPr marL="285750" indent="-285750">
+              <a:buFont typeface="Arial" panose="020B0604020202020204" pitchFamily="34" charset="0"/>
+              <a:buChar char="•"/>
+            </a:pPr>
+            <a:r>
+              <a:rPr lang="de-DE" dirty="0" err="1" smtClean="0"/>
+              <a:t>building</a:t>
+            </a:r>
+            <a:r>
+              <a:rPr lang="de-DE" dirty="0" smtClean="0"/>
+              <a:t> a </a:t>
+            </a:r>
+            <a:r>
+              <a:rPr lang="de-DE" dirty="0" err="1"/>
+              <a:t>M</a:t>
+            </a:r>
+            <a:r>
+              <a:rPr lang="de-DE" dirty="0" err="1" smtClean="0"/>
+              <a:t>aven</a:t>
+            </a:r>
+            <a:r>
+              <a:rPr lang="de-DE" dirty="0" smtClean="0"/>
+              <a:t> </a:t>
+            </a:r>
+            <a:r>
+              <a:rPr lang="de-DE" dirty="0" err="1" smtClean="0"/>
+              <a:t>project</a:t>
+            </a:r>
+            <a:r>
+              <a:rPr lang="de-DE" dirty="0" smtClean="0"/>
+              <a:t> </a:t>
+            </a:r>
+            <a:r>
+              <a:rPr lang="de-DE" dirty="0" err="1" smtClean="0"/>
+              <a:t>from</a:t>
+            </a:r>
+            <a:r>
+              <a:rPr lang="de-DE" dirty="0" smtClean="0"/>
+              <a:t> </a:t>
+            </a:r>
+            <a:r>
+              <a:rPr lang="de-DE" dirty="0" err="1" smtClean="0"/>
+              <a:t>archtype</a:t>
+            </a:r>
+            <a:r>
+              <a:rPr lang="de-DE" dirty="0" smtClean="0"/>
+              <a:t> wa</a:t>
+            </a:r>
+            <a:r>
+              <a:rPr lang="de-DE" dirty="0" smtClean="0"/>
+              <a:t>s not </a:t>
+            </a:r>
+            <a:r>
+              <a:rPr lang="de-DE" dirty="0" err="1" smtClean="0"/>
+              <a:t>possible</a:t>
+            </a:r>
+            <a:r>
+              <a:rPr lang="de-DE" dirty="0" smtClean="0"/>
+              <a:t>, </a:t>
+            </a:r>
+            <a:r>
+              <a:rPr lang="de-DE" dirty="0" err="1" smtClean="0"/>
+              <a:t>the</a:t>
+            </a:r>
+            <a:r>
+              <a:rPr lang="de-DE" dirty="0" smtClean="0"/>
+              <a:t> testet </a:t>
+            </a:r>
+            <a:r>
+              <a:rPr lang="de-DE" dirty="0" err="1" smtClean="0"/>
+              <a:t>ones</a:t>
+            </a:r>
+            <a:r>
+              <a:rPr lang="de-DE" dirty="0" smtClean="0"/>
+              <a:t> </a:t>
+            </a:r>
+            <a:r>
+              <a:rPr lang="de-DE" dirty="0" err="1" smtClean="0"/>
+              <a:t>were</a:t>
+            </a:r>
+            <a:r>
+              <a:rPr lang="de-DE" dirty="0" smtClean="0"/>
+              <a:t> </a:t>
+            </a:r>
+            <a:r>
+              <a:rPr lang="de-DE" dirty="0" err="1" smtClean="0"/>
+              <a:t>broken</a:t>
+            </a:r>
+            <a:r>
+              <a:rPr lang="de-DE" dirty="0" smtClean="0"/>
+              <a:t> </a:t>
+            </a:r>
+            <a:r>
+              <a:rPr lang="de-DE" dirty="0" err="1" smtClean="0"/>
+              <a:t>some</a:t>
+            </a:r>
+            <a:r>
+              <a:rPr lang="de-DE" dirty="0" smtClean="0"/>
+              <a:t> </a:t>
+            </a:r>
+            <a:r>
+              <a:rPr lang="de-DE" dirty="0" err="1" smtClean="0"/>
+              <a:t>how</a:t>
             </a:r>
             <a:endParaRPr lang="de-DE" dirty="0"/>
           </a:p>
@@ -3483,6 +4040,74 @@
           <a:bodyPr/>
           <a:lstStyle/>
           <a:p>
+            <a:r>
+              <a:rPr lang="de-DE" dirty="0" err="1" smtClean="0"/>
+              <a:t>We</a:t>
+            </a:r>
+            <a:r>
+              <a:rPr lang="de-DE" dirty="0" smtClean="0"/>
+              <a:t> </a:t>
+            </a:r>
+            <a:r>
+              <a:rPr lang="de-DE" dirty="0" err="1" smtClean="0"/>
+              <a:t>need</a:t>
+            </a:r>
+            <a:r>
+              <a:rPr lang="de-DE" dirty="0" smtClean="0"/>
+              <a:t> </a:t>
+            </a:r>
+            <a:r>
+              <a:rPr lang="de-DE" dirty="0" err="1" smtClean="0"/>
+              <a:t>to</a:t>
+            </a:r>
+            <a:r>
+              <a:rPr lang="de-DE" dirty="0" smtClean="0"/>
+              <a:t> </a:t>
+            </a:r>
+            <a:r>
+              <a:rPr lang="de-DE" dirty="0" err="1" smtClean="0"/>
+              <a:t>improve</a:t>
+            </a:r>
+            <a:r>
+              <a:rPr lang="de-DE" dirty="0" smtClean="0"/>
+              <a:t>, </a:t>
+            </a:r>
+            <a:r>
+              <a:rPr lang="de-DE" dirty="0" err="1" smtClean="0"/>
+              <a:t>how</a:t>
+            </a:r>
+            <a:r>
+              <a:rPr lang="de-DE" dirty="0" smtClean="0"/>
+              <a:t> </a:t>
+            </a:r>
+            <a:r>
+              <a:rPr lang="de-DE" dirty="0" err="1" smtClean="0"/>
+              <a:t>java</a:t>
+            </a:r>
+            <a:r>
+              <a:rPr lang="de-DE" dirty="0" smtClean="0"/>
+              <a:t> </a:t>
+            </a:r>
+            <a:r>
+              <a:rPr lang="de-DE" dirty="0" err="1" smtClean="0"/>
+              <a:t>presents</a:t>
+            </a:r>
+            <a:r>
+              <a:rPr lang="de-DE" dirty="0" smtClean="0"/>
+              <a:t> </a:t>
+            </a:r>
+            <a:r>
+              <a:rPr lang="de-DE" dirty="0" err="1" smtClean="0"/>
+              <a:t>json</a:t>
+            </a:r>
+            <a:r>
+              <a:rPr lang="de-DE" dirty="0" smtClean="0"/>
+              <a:t> </a:t>
+            </a:r>
+            <a:r>
+              <a:rPr lang="de-DE" dirty="0" err="1" smtClean="0"/>
+              <a:t>data</a:t>
+            </a:r>
             <a:endParaRPr lang="de-DE" dirty="0"/>
           </a:p>
         </p:txBody>

</xml_diff>